<commit_message>
Updated presentation, and added Evan's section for Demo 7 deliverables.
</commit_message>
<xml_diff>
--- a/Documents/Presentation.pptx
+++ b/Documents/Presentation.pptx
@@ -12,9 +12,12 @@
     <p:sldId id="285" r:id="rId6"/>
     <p:sldId id="284" r:id="rId7"/>
     <p:sldId id="282" r:id="rId8"/>
-    <p:sldId id="280" r:id="rId9"/>
-    <p:sldId id="281" r:id="rId10"/>
-    <p:sldId id="266" r:id="rId11"/>
+    <p:sldId id="286" r:id="rId9"/>
+    <p:sldId id="287" r:id="rId10"/>
+    <p:sldId id="288" r:id="rId11"/>
+    <p:sldId id="280" r:id="rId12"/>
+    <p:sldId id="281" r:id="rId13"/>
+    <p:sldId id="266" r:id="rId14"/>
   </p:sldIdLst>
   <p:sldSz cx="12192000" cy="6858000"/>
   <p:notesSz cx="6858000" cy="9144000"/>
@@ -115,7 +118,7 @@
   </p:defaultTextStyle>
   <p:extLst>
     <p:ext uri="{EFAFB233-063F-42B5-8137-9DF3F51BA10A}">
-      <p15:sldGuideLst xmlns="" xmlns:p15="http://schemas.microsoft.com/office/powerpoint/2012/main">
+      <p15:sldGuideLst xmlns:p15="http://schemas.microsoft.com/office/powerpoint/2012/main" xmlns="">
         <p15:guide id="1" orient="horz" pos="2160">
           <p15:clr>
             <a:srgbClr val="A4A3A4"/>
@@ -12465,6 +12468,270 @@
           <a:lstStyle/>
           <a:p>
             <a:r>
+              <a:rPr lang="en-US" dirty="0" smtClean="0"/>
+              <a:t>Problems &amp; Challenges</a:t>
+            </a:r>
+            <a:endParaRPr lang="en-US" dirty="0"/>
+          </a:p>
+        </p:txBody>
+      </p:sp>
+      <p:sp>
+        <p:nvSpPr>
+          <p:cNvPr id="3" name="Content Placeholder 2"/>
+          <p:cNvSpPr>
+            <a:spLocks noGrp="1"/>
+          </p:cNvSpPr>
+          <p:nvPr>
+            <p:ph idx="1"/>
+          </p:nvPr>
+        </p:nvSpPr>
+        <p:spPr/>
+        <p:txBody>
+          <a:bodyPr/>
+          <a:lstStyle/>
+          <a:p>
+            <a:pPr marL="0" indent="0">
+              <a:buNone/>
+            </a:pPr>
+            <a:r>
+              <a:rPr lang="en-CA" dirty="0" smtClean="0"/>
+              <a:t>Problem:	</a:t>
+            </a:r>
+            <a:r>
+              <a:rPr lang="en-CA" dirty="0"/>
+              <a:t>Adopting change requests into "completed" </a:t>
+            </a:r>
+            <a:r>
+              <a:rPr lang="en-CA" dirty="0" smtClean="0"/>
+              <a:t>code</a:t>
+            </a:r>
+          </a:p>
+          <a:p>
+            <a:pPr marL="0" indent="0">
+              <a:buNone/>
+            </a:pPr>
+            <a:endParaRPr lang="en-CA" dirty="0" smtClean="0"/>
+          </a:p>
+          <a:p>
+            <a:pPr marL="0" indent="0">
+              <a:buNone/>
+            </a:pPr>
+            <a:r>
+              <a:rPr lang="en-CA" dirty="0" smtClean="0"/>
+              <a:t>Solution:	</a:t>
+            </a:r>
+            <a:r>
+              <a:rPr lang="en-CA" dirty="0"/>
+              <a:t>Re-think the code logic to effectively accommodate new and </a:t>
+            </a:r>
+            <a:r>
+              <a:rPr lang="en-CA" dirty="0" smtClean="0"/>
+              <a:t>		existing </a:t>
+            </a:r>
+            <a:r>
+              <a:rPr lang="en-CA" dirty="0"/>
+              <a:t>functionality</a:t>
+            </a:r>
+            <a:endParaRPr lang="en-CA" dirty="0" smtClean="0"/>
+          </a:p>
+        </p:txBody>
+      </p:sp>
+    </p:spTree>
+    <p:extLst>
+      <p:ext uri="{BB962C8B-B14F-4D97-AF65-F5344CB8AC3E}">
+        <p14:creationId xmlns:p14="http://schemas.microsoft.com/office/powerpoint/2010/main" val="1463698916"/>
+      </p:ext>
+    </p:extLst>
+  </p:cSld>
+  <p:clrMapOvr>
+    <a:masterClrMapping/>
+  </p:clrMapOvr>
+</p:sld>
+</file>
+
+<file path=ppt/slides/slide11.xml><?xml version="1.0" encoding="utf-8"?>
+<p:sld xmlns:a="http://schemas.openxmlformats.org/drawingml/2006/main" xmlns:r="http://schemas.openxmlformats.org/officeDocument/2006/relationships" xmlns:p="http://schemas.openxmlformats.org/presentationml/2006/main">
+  <p:cSld>
+    <p:spTree>
+      <p:nvGrpSpPr>
+        <p:cNvPr id="1" name=""/>
+        <p:cNvGrpSpPr/>
+        <p:nvPr/>
+      </p:nvGrpSpPr>
+      <p:grpSpPr>
+        <a:xfrm>
+          <a:off x="0" y="0"/>
+          <a:ext cx="0" cy="0"/>
+          <a:chOff x="0" y="0"/>
+          <a:chExt cx="0" cy="0"/>
+        </a:xfrm>
+      </p:grpSpPr>
+      <p:sp>
+        <p:nvSpPr>
+          <p:cNvPr id="2" name="Title 1"/>
+          <p:cNvSpPr>
+            <a:spLocks noGrp="1"/>
+          </p:cNvSpPr>
+          <p:nvPr>
+            <p:ph type="title"/>
+          </p:nvPr>
+        </p:nvSpPr>
+        <p:spPr/>
+        <p:txBody>
+          <a:bodyPr/>
+          <a:lstStyle/>
+          <a:p>
+            <a:r>
+              <a:rPr lang="en-US" dirty="0" smtClean="0"/>
+              <a:t>Skills Learned</a:t>
+            </a:r>
+            <a:endParaRPr lang="en-US" dirty="0"/>
+          </a:p>
+        </p:txBody>
+      </p:sp>
+      <p:sp>
+        <p:nvSpPr>
+          <p:cNvPr id="3" name="Content Placeholder 2"/>
+          <p:cNvSpPr>
+            <a:spLocks noGrp="1"/>
+          </p:cNvSpPr>
+          <p:nvPr>
+            <p:ph idx="1"/>
+          </p:nvPr>
+        </p:nvSpPr>
+        <p:spPr/>
+        <p:txBody>
+          <a:bodyPr/>
+          <a:lstStyle/>
+          <a:p>
+            <a:r>
+              <a:rPr lang="en-CA" dirty="0" smtClean="0"/>
+              <a:t>…</a:t>
+            </a:r>
+          </a:p>
+        </p:txBody>
+      </p:sp>
+    </p:spTree>
+    <p:extLst>
+      <p:ext uri="{BB962C8B-B14F-4D97-AF65-F5344CB8AC3E}">
+        <p14:creationId xmlns:p14="http://schemas.microsoft.com/office/powerpoint/2010/main" val="3684803519"/>
+      </p:ext>
+    </p:extLst>
+  </p:cSld>
+  <p:clrMapOvr>
+    <a:masterClrMapping/>
+  </p:clrMapOvr>
+</p:sld>
+</file>
+
+<file path=ppt/slides/slide12.xml><?xml version="1.0" encoding="utf-8"?>
+<p:sld xmlns:a="http://schemas.openxmlformats.org/drawingml/2006/main" xmlns:r="http://schemas.openxmlformats.org/officeDocument/2006/relationships" xmlns:p="http://schemas.openxmlformats.org/presentationml/2006/main">
+  <p:cSld>
+    <p:spTree>
+      <p:nvGrpSpPr>
+        <p:cNvPr id="1" name=""/>
+        <p:cNvGrpSpPr/>
+        <p:nvPr/>
+      </p:nvGrpSpPr>
+      <p:grpSpPr>
+        <a:xfrm>
+          <a:off x="0" y="0"/>
+          <a:ext cx="0" cy="0"/>
+          <a:chOff x="0" y="0"/>
+          <a:chExt cx="0" cy="0"/>
+        </a:xfrm>
+      </p:grpSpPr>
+      <p:sp>
+        <p:nvSpPr>
+          <p:cNvPr id="2" name="Title 1"/>
+          <p:cNvSpPr>
+            <a:spLocks noGrp="1"/>
+          </p:cNvSpPr>
+          <p:nvPr>
+            <p:ph type="title"/>
+          </p:nvPr>
+        </p:nvSpPr>
+        <p:spPr/>
+        <p:txBody>
+          <a:bodyPr/>
+          <a:lstStyle/>
+          <a:p>
+            <a:r>
+              <a:rPr lang="en-US" dirty="0" smtClean="0"/>
+              <a:t>Proposed Changes</a:t>
+            </a:r>
+            <a:endParaRPr lang="en-US" dirty="0"/>
+          </a:p>
+        </p:txBody>
+      </p:sp>
+      <p:sp>
+        <p:nvSpPr>
+          <p:cNvPr id="3" name="Content Placeholder 2"/>
+          <p:cNvSpPr>
+            <a:spLocks noGrp="1"/>
+          </p:cNvSpPr>
+          <p:nvPr>
+            <p:ph idx="1"/>
+          </p:nvPr>
+        </p:nvSpPr>
+        <p:spPr/>
+        <p:txBody>
+          <a:bodyPr/>
+          <a:lstStyle/>
+          <a:p>
+            <a:r>
+              <a:rPr lang="en-CA" dirty="0" smtClean="0"/>
+              <a:t>…</a:t>
+            </a:r>
+          </a:p>
+        </p:txBody>
+      </p:sp>
+    </p:spTree>
+    <p:extLst>
+      <p:ext uri="{BB962C8B-B14F-4D97-AF65-F5344CB8AC3E}">
+        <p14:creationId xmlns:p14="http://schemas.microsoft.com/office/powerpoint/2010/main" val="3410798667"/>
+      </p:ext>
+    </p:extLst>
+  </p:cSld>
+  <p:clrMapOvr>
+    <a:masterClrMapping/>
+  </p:clrMapOvr>
+</p:sld>
+</file>
+
+<file path=ppt/slides/slide13.xml><?xml version="1.0" encoding="utf-8"?>
+<p:sld xmlns:a="http://schemas.openxmlformats.org/drawingml/2006/main" xmlns:r="http://schemas.openxmlformats.org/officeDocument/2006/relationships" xmlns:p="http://schemas.openxmlformats.org/presentationml/2006/main">
+  <p:cSld>
+    <p:spTree>
+      <p:nvGrpSpPr>
+        <p:cNvPr id="1" name=""/>
+        <p:cNvGrpSpPr/>
+        <p:nvPr/>
+      </p:nvGrpSpPr>
+      <p:grpSpPr>
+        <a:xfrm>
+          <a:off x="0" y="0"/>
+          <a:ext cx="0" cy="0"/>
+          <a:chOff x="0" y="0"/>
+          <a:chExt cx="0" cy="0"/>
+        </a:xfrm>
+      </p:grpSpPr>
+      <p:sp>
+        <p:nvSpPr>
+          <p:cNvPr id="2" name="Title 1"/>
+          <p:cNvSpPr>
+            <a:spLocks noGrp="1"/>
+          </p:cNvSpPr>
+          <p:nvPr>
+            <p:ph type="title"/>
+          </p:nvPr>
+        </p:nvSpPr>
+        <p:spPr/>
+        <p:txBody>
+          <a:bodyPr/>
+          <a:lstStyle/>
+          <a:p>
+            <a:r>
               <a:rPr lang="en-US" dirty="0"/>
               <a:t>Concluding remarks</a:t>
             </a:r>
@@ -12534,7 +12801,7 @@
           <p:cNvPr id="2" name="Title 1">
             <a:extLst>
               <a:ext uri="{FF2B5EF4-FFF2-40B4-BE49-F238E27FC236}">
-                <a16:creationId xmlns="" xmlns:a16="http://schemas.microsoft.com/office/drawing/2014/main" id="{F9AE0035-9CD5-4A6E-998F-7839B922D5AB}"/>
+                <a16:creationId xmlns:a16="http://schemas.microsoft.com/office/drawing/2014/main" xmlns="" id="{F9AE0035-9CD5-4A6E-998F-7839B922D5AB}"/>
               </a:ext>
             </a:extLst>
           </p:cNvPr>
@@ -12562,7 +12829,7 @@
           <p:cNvPr id="3" name="Content Placeholder 2">
             <a:extLst>
               <a:ext uri="{FF2B5EF4-FFF2-40B4-BE49-F238E27FC236}">
-                <a16:creationId xmlns="" xmlns:a16="http://schemas.microsoft.com/office/drawing/2014/main" id="{BFAA6E3D-900D-424D-935D-90602F7437FD}"/>
+                <a16:creationId xmlns:a16="http://schemas.microsoft.com/office/drawing/2014/main" xmlns="" id="{BFAA6E3D-900D-424D-935D-90602F7437FD}"/>
               </a:ext>
             </a:extLst>
           </p:cNvPr>
@@ -12950,17 +13217,69 @@
             </a:pPr>
             <a:r>
               <a:rPr lang="en-CA" dirty="0" smtClean="0"/>
-              <a:t>Problem:	…</a:t>
-            </a:r>
+              <a:t>Problem:	</a:t>
+            </a:r>
+            <a:r>
+              <a:rPr lang="en-CA" dirty="0"/>
+              <a:t>C</a:t>
+            </a:r>
+            <a:r>
+              <a:rPr lang="en-CA" dirty="0" smtClean="0"/>
+              <a:t>hanging </a:t>
+            </a:r>
+            <a:r>
+              <a:rPr lang="en-CA" dirty="0"/>
+              <a:t>the </a:t>
+            </a:r>
+            <a:r>
+              <a:rPr lang="en-CA" dirty="0" smtClean="0"/>
+              <a:t>cart quantities </a:t>
+            </a:r>
+            <a:r>
+              <a:rPr lang="en-CA" dirty="0"/>
+              <a:t>without reloading the page</a:t>
+            </a:r>
+            <a:endParaRPr lang="en-CA" dirty="0" smtClean="0"/>
           </a:p>
           <a:p>
             <a:pPr marL="0" indent="0">
               <a:buNone/>
             </a:pPr>
+            <a:endParaRPr lang="en-CA" dirty="0" smtClean="0"/>
+          </a:p>
+          <a:p>
+            <a:pPr marL="0" indent="0">
+              <a:buNone/>
+            </a:pPr>
             <a:r>
               <a:rPr lang="en-CA" dirty="0" smtClean="0"/>
-              <a:t>Solution:	…</a:t>
-            </a:r>
+              <a:t>Solution:	</a:t>
+            </a:r>
+            <a:r>
+              <a:rPr lang="en-CA" dirty="0"/>
+              <a:t>Learned </a:t>
+            </a:r>
+            <a:r>
+              <a:rPr lang="en-CA" dirty="0" smtClean="0"/>
+              <a:t>to </a:t>
+            </a:r>
+            <a:r>
+              <a:rPr lang="en-CA" dirty="0"/>
+              <a:t>use ajax to change quantity with </a:t>
+            </a:r>
+            <a:r>
+              <a:rPr lang="en-CA" dirty="0" smtClean="0"/>
+              <a:t>server-side </a:t>
+            </a:r>
+            <a:r>
+              <a:rPr lang="en-CA" dirty="0"/>
+              <a:t>script</a:t>
+            </a:r>
+            <a:r>
+              <a:rPr lang="en-CA" dirty="0" smtClean="0"/>
+              <a:t>.</a:t>
+            </a:r>
+            <a:endParaRPr lang="en-CA" dirty="0" smtClean="0"/>
           </a:p>
         </p:txBody>
       </p:sp>
@@ -13011,7 +13330,7 @@
           <a:p>
             <a:r>
               <a:rPr lang="en-US" dirty="0" smtClean="0"/>
-              <a:t>Skills Learned</a:t>
+              <a:t>Problems &amp; Challenges</a:t>
             </a:r>
             <a:endParaRPr lang="en-US" dirty="0"/>
           </a:p>
@@ -13032,17 +13351,56 @@
           <a:bodyPr/>
           <a:lstStyle/>
           <a:p>
+            <a:pPr marL="0" indent="0">
+              <a:buNone/>
+            </a:pPr>
             <a:r>
               <a:rPr lang="en-CA" dirty="0" smtClean="0"/>
-              <a:t>…</a:t>
-            </a:r>
+              <a:t>Problem:	</a:t>
+            </a:r>
+            <a:r>
+              <a:rPr lang="en-CA" dirty="0"/>
+              <a:t>Git conflicts when pushing your </a:t>
+            </a:r>
+            <a:r>
+              <a:rPr lang="en-CA" dirty="0" smtClean="0"/>
+              <a:t>work</a:t>
+            </a:r>
+          </a:p>
+          <a:p>
+            <a:pPr marL="0" indent="0">
+              <a:buNone/>
+            </a:pPr>
+            <a:endParaRPr lang="en-CA" dirty="0" smtClean="0"/>
+          </a:p>
+          <a:p>
+            <a:pPr marL="0" indent="0">
+              <a:buNone/>
+            </a:pPr>
+            <a:r>
+              <a:rPr lang="en-CA" dirty="0" smtClean="0"/>
+              <a:t>Solution:	</a:t>
+            </a:r>
+            <a:r>
+              <a:rPr lang="en-CA" dirty="0"/>
+              <a:t>Ensuring that the most recent version of master was pulled and </a:t>
+            </a:r>
+            <a:r>
+              <a:rPr lang="en-CA" dirty="0" smtClean="0"/>
+              <a:t>		rebased </a:t>
+            </a:r>
+            <a:r>
+              <a:rPr lang="en-CA" dirty="0"/>
+              <a:t>in branch before work begins</a:t>
+            </a:r>
+            <a:endParaRPr lang="en-CA" dirty="0" smtClean="0"/>
           </a:p>
         </p:txBody>
       </p:sp>
     </p:spTree>
     <p:extLst>
       <p:ext uri="{BB962C8B-B14F-4D97-AF65-F5344CB8AC3E}">
-        <p14:creationId xmlns:p14="http://schemas.microsoft.com/office/powerpoint/2010/main" val="3684803519"/>
+        <p14:creationId xmlns:p14="http://schemas.microsoft.com/office/powerpoint/2010/main" val="3772083529"/>
       </p:ext>
     </p:extLst>
   </p:cSld>
@@ -13086,7 +13444,7 @@
           <a:p>
             <a:r>
               <a:rPr lang="en-US" dirty="0" smtClean="0"/>
-              <a:t>Proposed Changes</a:t>
+              <a:t>Problems &amp; Challenges</a:t>
             </a:r>
             <a:endParaRPr lang="en-US" dirty="0"/>
           </a:p>
@@ -13107,17 +13465,60 @@
           <a:bodyPr/>
           <a:lstStyle/>
           <a:p>
+            <a:pPr marL="0" indent="0">
+              <a:buNone/>
+            </a:pPr>
             <a:r>
               <a:rPr lang="en-CA" dirty="0" smtClean="0"/>
-              <a:t>…</a:t>
-            </a:r>
+              <a:t>Problem:	</a:t>
+            </a:r>
+            <a:r>
+              <a:rPr lang="en-CA" dirty="0"/>
+              <a:t>Git problems with </a:t>
+            </a:r>
+            <a:r>
+              <a:rPr lang="en-CA" dirty="0" smtClean="0"/>
+              <a:t>temp </a:t>
+            </a:r>
+            <a:r>
+              <a:rPr lang="en-CA" dirty="0"/>
+              <a:t>files made by Microsoft when file is </a:t>
+            </a:r>
+            <a:r>
+              <a:rPr lang="en-CA" dirty="0" smtClean="0"/>
+              <a:t>open</a:t>
+            </a:r>
+          </a:p>
+          <a:p>
+            <a:pPr marL="0" indent="0">
+              <a:buNone/>
+            </a:pPr>
+            <a:endParaRPr lang="en-CA" dirty="0" smtClean="0"/>
+          </a:p>
+          <a:p>
+            <a:pPr marL="0" indent="0">
+              <a:buNone/>
+            </a:pPr>
+            <a:r>
+              <a:rPr lang="en-CA" dirty="0" smtClean="0"/>
+              <a:t>Solution:	</a:t>
+            </a:r>
+            <a:r>
+              <a:rPr lang="en-CA" dirty="0"/>
+              <a:t>Close all windows before pushing to </a:t>
+            </a:r>
+            <a:r>
+              <a:rPr lang="en-CA" dirty="0" smtClean="0"/>
+              <a:t>Git</a:t>
+            </a:r>
+            <a:endParaRPr lang="en-CA" dirty="0" smtClean="0"/>
           </a:p>
         </p:txBody>
       </p:sp>
     </p:spTree>
     <p:extLst>
       <p:ext uri="{BB962C8B-B14F-4D97-AF65-F5344CB8AC3E}">
-        <p14:creationId xmlns:p14="http://schemas.microsoft.com/office/powerpoint/2010/main" val="3410798667"/>
+        <p14:creationId xmlns:p14="http://schemas.microsoft.com/office/powerpoint/2010/main" val="39603794"/>
       </p:ext>
     </p:extLst>
   </p:cSld>
@@ -13372,7 +13773,7 @@
   <a:extraClrSchemeLst/>
   <a:extLst>
     <a:ext uri="{05A4C25C-085E-4340-85A3-A5531E510DB2}">
-      <thm15:themeFamily xmlns="" xmlns:thm15="http://schemas.microsoft.com/office/thememl/2012/main" name="Circuit" id="{0AC2F7E7-15F5-431C-B2A2-456FE929F56C}" vid="{0911B802-464C-4241-8DD9-B60FF88E379F}"/>
+      <thm15:themeFamily xmlns:thm15="http://schemas.microsoft.com/office/thememl/2012/main" xmlns="" name="Circuit" id="{0AC2F7E7-15F5-431C-B2A2-456FE929F56C}" vid="{0911B802-464C-4241-8DD9-B60FF88E379F}"/>
     </a:ext>
   </a:extLst>
 </a:theme>

</xml_diff>